<commit_message>
tdf#134210 Better testing for cropping bitmap of custom shape.
Change-Id: I592e2e99306a4aa27dce17e8b8d75e4bb2262cab
Reviewed-on: https://gerrit.libreoffice.org/c/core/+/110723
Tested-by: Jenkins
Reviewed-by: Gülşah Köse <gulsah.kose@collabora.com>
</commit_message>
<xml_diff>
--- a/sd/qa/unit/data/pptx/crop-position.pptx
+++ b/sd/qa/unit/data/pptx/crop-position.pptx
@@ -138,7 +138,7 @@
     </p:spTree>
     <p:extLst>
       <p:ext uri="{BB962C8B-B14F-4D97-AF65-F5344CB8AC3E}">
-        <p14:creationId xmlns:p14="http://schemas.microsoft.com/office/powerpoint/2010/main" val="3072211800"/>
+        <p14:creationId xmlns:p14="http://schemas.microsoft.com/office/powerpoint/2010/main" val="3873831399"/>
       </p:ext>
     </p:extLst>
   </p:cSld>
@@ -171,7 +171,7 @@
     </p:spTree>
     <p:extLst>
       <p:ext uri="{BB962C8B-B14F-4D97-AF65-F5344CB8AC3E}">
-        <p14:creationId xmlns:p14="http://schemas.microsoft.com/office/powerpoint/2010/main" val="1135732158"/>
+        <p14:creationId xmlns:p14="http://schemas.microsoft.com/office/powerpoint/2010/main" val="3854048724"/>
       </p:ext>
     </p:extLst>
   </p:cSld>
@@ -269,6 +269,87 @@
     </a:lvl9pPr>
   </p:notesStyle>
 </p:notesMaster>
+</file>
+
+<file path=ppt/notesSlides/notesSlide1.xml><?xml version="1.0" encoding="utf-8"?>
+<p:notes xmlns:a="http://schemas.openxmlformats.org/drawingml/2006/main" xmlns:r="http://schemas.openxmlformats.org/officeDocument/2006/relationships" xmlns:p="http://schemas.openxmlformats.org/presentationml/2006/main">
+  <p:cSld>
+    <p:spTree>
+      <p:nvGrpSpPr>
+        <p:cNvPr id="1" name=""/>
+        <p:cNvGrpSpPr/>
+        <p:nvPr/>
+      </p:nvGrpSpPr>
+      <p:grpSpPr>
+        <a:xfrm>
+          <a:off x="0" y="0"/>
+          <a:ext cx="0" cy="0"/>
+          <a:chOff x="0" y="0"/>
+          <a:chExt cx="0" cy="0"/>
+        </a:xfrm>
+      </p:grpSpPr>
+      <p:sp>
+        <p:nvSpPr>
+          <p:cNvPr id="2" name="Slide Image Placeholder 1"/>
+          <p:cNvSpPr>
+            <a:spLocks noGrp="1" noRot="1" noChangeAspect="1"/>
+          </p:cNvSpPr>
+          <p:nvPr>
+            <p:ph type="sldImg"/>
+          </p:nvPr>
+        </p:nvSpPr>
+        <p:spPr>
+          <a:xfrm>
+            <a:off x="1143000" y="685800"/>
+            <a:ext cx="4572000" cy="3429000"/>
+          </a:xfrm>
+          <a:prstGeom prst="rect">
+            <a:avLst/>
+          </a:prstGeom>
+        </p:spPr>
+      </p:sp>
+      <p:sp>
+        <p:nvSpPr>
+          <p:cNvPr id="4" name="Slide Number Placeholder 3"/>
+          <p:cNvSpPr>
+            <a:spLocks noGrp="1"/>
+          </p:cNvSpPr>
+          <p:nvPr>
+            <p:ph type="sldNum" sz="quarter" idx="10"/>
+          </p:nvPr>
+        </p:nvSpPr>
+        <p:spPr>
+          <a:xfrm>
+            <a:off x="3884613" y="8685213"/>
+            <a:ext cx="2971800" cy="457200"/>
+          </a:xfrm>
+          <a:prstGeom prst="rect">
+            <a:avLst/>
+          </a:prstGeom>
+        </p:spPr>
+        <p:txBody>
+          <a:bodyPr/>
+          <a:lstStyle/>
+          <a:p>
+            <a:fld id="{664E7642-6B48-4E86-BFEC-A4F557EAC24B}" type="slidenum">
+              <a:rPr lang="tr-TR" smtClean="0"/>
+              <a:t>1</a:t>
+            </a:fld>
+            <a:endParaRPr lang="tr-TR"/>
+          </a:p>
+        </p:txBody>
+      </p:sp>
+    </p:spTree>
+    <p:extLst>
+      <p:ext uri="{BB962C8B-B14F-4D97-AF65-F5344CB8AC3E}">
+        <p14:creationId xmlns:p14="http://schemas.microsoft.com/office/powerpoint/2010/main" val="64109716"/>
+      </p:ext>
+    </p:extLst>
+  </p:cSld>
+  <p:clrMapOvr>
+    <a:masterClrMapping/>
+  </p:clrMapOvr>
+</p:notes>
 </file>
 
 <file path=ppt/slideLayouts/slideLayout1.xml><?xml version="1.0" encoding="utf-8"?>
@@ -291,7 +372,7 @@
     </p:spTree>
     <p:extLst>
       <p:ext uri="{BB962C8B-B14F-4D97-AF65-F5344CB8AC3E}">
-        <p14:creationId xmlns:p14="http://schemas.microsoft.com/office/powerpoint/2010/main" val="3080239795"/>
+        <p14:creationId xmlns:p14="http://schemas.microsoft.com/office/powerpoint/2010/main" val="966273280"/>
       </p:ext>
     </p:extLst>
   </p:cSld>
@@ -326,7 +407,7 @@
     </p:spTree>
     <p:extLst>
       <p:ext uri="{BB962C8B-B14F-4D97-AF65-F5344CB8AC3E}">
-        <p14:creationId xmlns:p14="http://schemas.microsoft.com/office/powerpoint/2010/main" val="2694697174"/>
+        <p14:creationId xmlns:p14="http://schemas.microsoft.com/office/powerpoint/2010/main" val="398586448"/>
       </p:ext>
     </p:extLst>
   </p:cSld>
@@ -606,37 +687,67 @@
       </p:grpSpPr>
       <p:pic>
         <p:nvPicPr>
-          <p:cNvPr id="10" name="Picture 9"/>
+          <p:cNvPr id="5" name="Picture 4"/>
           <p:cNvPicPr>
             <a:picLocks noChangeAspect="1"/>
           </p:cNvPicPr>
           <p:nvPr/>
         </p:nvPicPr>
         <p:blipFill rotWithShape="1">
-          <a:blip r:embed="rId2" cstate="print">
+          <a:blip r:embed="rId3">
             <a:extLst>
               <a:ext uri="{28A0092B-C50C-407E-A947-70E740481C1C}">
                 <a14:useLocalDpi xmlns:a14="http://schemas.microsoft.com/office/drawing/2010/main" val="0"/>
               </a:ext>
             </a:extLst>
           </a:blip>
-          <a:srcRect l="46662" r="12305"/>
+          <a:srcRect l="10406" t="10714" r="9883" b="9127"/>
           <a:stretch/>
         </p:blipFill>
         <p:spPr>
           <a:xfrm>
-            <a:off x="2987824" y="1988840"/>
-            <a:ext cx="2559233" cy="1706615"/>
+            <a:off x="2638425" y="1504950"/>
+            <a:ext cx="3867150" cy="3848100"/>
           </a:xfrm>
           <a:prstGeom prst="roundRect">
             <a:avLst/>
           </a:prstGeom>
         </p:spPr>
       </p:pic>
+      <p:sp>
+        <p:nvSpPr>
+          <p:cNvPr id="6" name="TextBox 5"/>
+          <p:cNvSpPr txBox="1"/>
+          <p:nvPr/>
+        </p:nvSpPr>
+        <p:spPr>
+          <a:xfrm>
+            <a:off x="2195736" y="692696"/>
+            <a:ext cx="4737002" cy="369332"/>
+          </a:xfrm>
+          <a:prstGeom prst="rect">
+            <a:avLst/>
+          </a:prstGeom>
+          <a:noFill/>
+        </p:spPr>
+        <p:txBody>
+          <a:bodyPr wrap="none" rtlCol="0">
+            <a:spAutoFit/>
+          </a:bodyPr>
+          <a:lstStyle/>
+          <a:p>
+            <a:r>
+              <a:rPr lang="tr-TR" dirty="0" smtClean="0"/>
+              <a:t>We should see only green in the round rectangle</a:t>
+            </a:r>
+            <a:endParaRPr lang="tr-TR" dirty="0"/>
+          </a:p>
+        </p:txBody>
+      </p:sp>
     </p:spTree>
     <p:extLst>
       <p:ext uri="{BB962C8B-B14F-4D97-AF65-F5344CB8AC3E}">
-        <p14:creationId xmlns:p14="http://schemas.microsoft.com/office/powerpoint/2010/main" val="476711784"/>
+        <p14:creationId xmlns:p14="http://schemas.microsoft.com/office/powerpoint/2010/main" val="510885078"/>
       </p:ext>
     </p:extLst>
   </p:cSld>

</xml_diff>